<commit_message>
Registro en cpp y aumento en PPT"
</commit_message>
<xml_diff>
--- a/Huaman_Espinoza_Vasquez_Algortimos_Ordenacion.pptx
+++ b/Huaman_Espinoza_Vasquez_Algortimos_Ordenacion.pptx
@@ -11,8 +11,9 @@
     <p:sldId id="259" r:id="rId5"/>
     <p:sldId id="261" r:id="rId6"/>
     <p:sldId id="262" r:id="rId7"/>
-    <p:sldId id="263" r:id="rId8"/>
-    <p:sldId id="260" r:id="rId9"/>
+    <p:sldId id="264" r:id="rId8"/>
+    <p:sldId id="263" r:id="rId9"/>
+    <p:sldId id="260" r:id="rId10"/>
   </p:sldIdLst>
   <p:sldSz cx="12192000" cy="6858000"/>
   <p:notesSz cx="6858000" cy="9144000"/>
@@ -6669,6 +6670,126 @@
           <p:cNvPr id="4" name="CuadroTexto 3">
             <a:extLst>
               <a:ext uri="{FF2B5EF4-FFF2-40B4-BE49-F238E27FC236}">
+                <a16:creationId xmlns:a16="http://schemas.microsoft.com/office/drawing/2014/main" id="{FCDDBA12-E381-6AF6-061A-AF421941E311}"/>
+              </a:ext>
+            </a:extLst>
+          </p:cNvPr>
+          <p:cNvSpPr txBox="1"/>
+          <p:nvPr/>
+        </p:nvSpPr>
+        <p:spPr>
+          <a:xfrm>
+            <a:off x="4388258" y="1825211"/>
+            <a:ext cx="3415484" cy="1107996"/>
+          </a:xfrm>
+          <a:prstGeom prst="rect">
+            <a:avLst/>
+          </a:prstGeom>
+          <a:solidFill>
+            <a:srgbClr val="CFCFCF"/>
+          </a:solidFill>
+        </p:spPr>
+        <p:txBody>
+          <a:bodyPr wrap="square" rtlCol="0">
+            <a:spAutoFit/>
+          </a:bodyPr>
+          <a:lstStyle/>
+          <a:p>
+            <a:pPr algn="ctr"/>
+            <a:r>
+              <a:rPr lang="es-ES" sz="6600" dirty="0">
+                <a:latin typeface="Bahnschrift SemiBold Condensed" panose="020B0502040204020203" pitchFamily="34" charset="0"/>
+              </a:rPr>
+              <a:t>PREGUNTAS</a:t>
+            </a:r>
+            <a:endParaRPr lang="es-PE" sz="6600" dirty="0">
+              <a:latin typeface="Bahnschrift SemiBold Condensed" panose="020B0502040204020203" pitchFamily="34" charset="0"/>
+            </a:endParaRPr>
+          </a:p>
+        </p:txBody>
+      </p:sp>
+      <p:pic>
+        <p:nvPicPr>
+          <p:cNvPr id="1026" name="Picture 2" descr="Tipos de pregunta - Appgree">
+            <a:extLst>
+              <a:ext uri="{FF2B5EF4-FFF2-40B4-BE49-F238E27FC236}">
+                <a16:creationId xmlns:a16="http://schemas.microsoft.com/office/drawing/2014/main" id="{613673AF-421F-0D0B-E47C-2A21537D0109}"/>
+              </a:ext>
+            </a:extLst>
+          </p:cNvPr>
+          <p:cNvPicPr>
+            <a:picLocks noChangeAspect="1" noChangeArrowheads="1"/>
+          </p:cNvPicPr>
+          <p:nvPr/>
+        </p:nvPicPr>
+        <p:blipFill>
+          <a:blip r:embed="rId2">
+            <a:extLst>
+              <a:ext uri="{28A0092B-C50C-407E-A947-70E740481C1C}">
+                <a14:useLocalDpi xmlns:a14="http://schemas.microsoft.com/office/drawing/2010/main" val="0"/>
+              </a:ext>
+            </a:extLst>
+          </a:blip>
+          <a:srcRect/>
+          <a:stretch>
+            <a:fillRect/>
+          </a:stretch>
+        </p:blipFill>
+        <p:spPr bwMode="auto">
+          <a:xfrm>
+            <a:off x="4667250" y="2643717"/>
+            <a:ext cx="2857500" cy="2857500"/>
+          </a:xfrm>
+          <a:prstGeom prst="rect">
+            <a:avLst/>
+          </a:prstGeom>
+          <a:noFill/>
+          <a:extLst>
+            <a:ext uri="{909E8E84-426E-40DD-AFC4-6F175D3DCCD1}">
+              <a14:hiddenFill xmlns:a14="http://schemas.microsoft.com/office/drawing/2010/main">
+                <a:solidFill>
+                  <a:srgbClr val="FFFFFF"/>
+                </a:solidFill>
+              </a14:hiddenFill>
+            </a:ext>
+          </a:extLst>
+        </p:spPr>
+      </p:pic>
+    </p:spTree>
+    <p:extLst>
+      <p:ext uri="{BB962C8B-B14F-4D97-AF65-F5344CB8AC3E}">
+        <p14:creationId xmlns:p14="http://schemas.microsoft.com/office/powerpoint/2010/main" val="57818267"/>
+      </p:ext>
+    </p:extLst>
+  </p:cSld>
+  <p:clrMapOvr>
+    <a:masterClrMapping/>
+  </p:clrMapOvr>
+</p:sld>
+</file>
+
+<file path=ppt/slides/slide8.xml><?xml version="1.0" encoding="utf-8"?>
+<p:sld xmlns:a="http://schemas.openxmlformats.org/drawingml/2006/main" xmlns:r="http://schemas.openxmlformats.org/officeDocument/2006/relationships" xmlns:p="http://schemas.openxmlformats.org/presentationml/2006/main">
+  <p:cSld>
+    <p:spTree>
+      <p:nvGrpSpPr>
+        <p:cNvPr id="1" name=""/>
+        <p:cNvGrpSpPr/>
+        <p:nvPr/>
+      </p:nvGrpSpPr>
+      <p:grpSpPr>
+        <a:xfrm>
+          <a:off x="0" y="0"/>
+          <a:ext cx="0" cy="0"/>
+          <a:chOff x="0" y="0"/>
+          <a:chExt cx="0" cy="0"/>
+        </a:xfrm>
+      </p:grpSpPr>
+      <p:sp>
+        <p:nvSpPr>
+          <p:cNvPr id="4" name="CuadroTexto 3">
+            <a:extLst>
+              <a:ext uri="{FF2B5EF4-FFF2-40B4-BE49-F238E27FC236}">
                 <a16:creationId xmlns:a16="http://schemas.microsoft.com/office/drawing/2014/main" id="{21581FFF-AA69-C80B-48B1-B8AAD732681D}"/>
               </a:ext>
             </a:extLst>
@@ -6767,7 +6888,7 @@
 </p:sld>
 </file>
 
-<file path=ppt/slides/slide8.xml><?xml version="1.0" encoding="utf-8"?>
+<file path=ppt/slides/slide9.xml><?xml version="1.0" encoding="utf-8"?>
 <p:sld xmlns:a="http://schemas.openxmlformats.org/drawingml/2006/main" xmlns:r="http://schemas.openxmlformats.org/officeDocument/2006/relationships" xmlns:p="http://schemas.openxmlformats.org/presentationml/2006/main">
   <p:cSld>
     <p:spTree>

</xml_diff>